<commit_message>
run 3 of remote task questions after each image instaed of every 4
</commit_message>
<xml_diff>
--- a/public/js/tasks/ncair/media/Ncair_Remote_Instructions.pptx
+++ b/public/js/tasks/ncair/media/Ncair_Remote_Instructions.pptx
@@ -232,7 +232,7 @@
           <a:p>
             <a:fld id="{5ACDFB13-8C7E-2148-B293-047F9641DD71}" type="datetimeFigureOut">
               <a:rPr lang="en-US" smtClean="0"/>
-              <a:t>3/17/21</a:t>
+              <a:t>4/5/21</a:t>
             </a:fld>
             <a:endParaRPr lang="en-US" dirty="0"/>
           </a:p>
@@ -1366,14 +1366,6 @@
           <a:bodyPr/>
           <a:lstStyle/>
           <a:p>
-            <a:r>
-              <a:rPr lang="en-US" dirty="0"/>
-              <a:t>Add screenshots of an X and an O</a:t>
-            </a:r>
-            <a:r>
-              <a:rPr lang="en-US" baseline="0" dirty="0"/>
-              <a:t> screen – like a timeline of screenshots.</a:t>
-            </a:r>
             <a:endParaRPr lang="en-US" dirty="0"/>
           </a:p>
         </p:txBody>
@@ -2980,7 +2972,7 @@
           <a:p>
             <a:fld id="{E69A4D3A-6EF8-7448-AC6F-AD52FEDAA6A8}" type="datetimeFigureOut">
               <a:rPr lang="en-US" smtClean="0"/>
-              <a:t>3/17/21</a:t>
+              <a:t>4/5/21</a:t>
             </a:fld>
             <a:endParaRPr lang="en-US" dirty="0"/>
           </a:p>
@@ -3148,7 +3140,7 @@
           <a:p>
             <a:fld id="{E69A4D3A-6EF8-7448-AC6F-AD52FEDAA6A8}" type="datetimeFigureOut">
               <a:rPr lang="en-US" smtClean="0"/>
-              <a:t>3/17/21</a:t>
+              <a:t>4/5/21</a:t>
             </a:fld>
             <a:endParaRPr lang="en-US" dirty="0"/>
           </a:p>
@@ -3326,7 +3318,7 @@
           <a:p>
             <a:fld id="{E69A4D3A-6EF8-7448-AC6F-AD52FEDAA6A8}" type="datetimeFigureOut">
               <a:rPr lang="en-US" smtClean="0"/>
-              <a:t>3/17/21</a:t>
+              <a:t>4/5/21</a:t>
             </a:fld>
             <a:endParaRPr lang="en-US" dirty="0"/>
           </a:p>
@@ -3494,7 +3486,7 @@
           <a:p>
             <a:fld id="{E69A4D3A-6EF8-7448-AC6F-AD52FEDAA6A8}" type="datetimeFigureOut">
               <a:rPr lang="en-US" smtClean="0"/>
-              <a:t>3/17/21</a:t>
+              <a:t>4/5/21</a:t>
             </a:fld>
             <a:endParaRPr lang="en-US" dirty="0"/>
           </a:p>
@@ -3739,7 +3731,7 @@
           <a:p>
             <a:fld id="{E69A4D3A-6EF8-7448-AC6F-AD52FEDAA6A8}" type="datetimeFigureOut">
               <a:rPr lang="en-US" smtClean="0"/>
-              <a:t>3/17/21</a:t>
+              <a:t>4/5/21</a:t>
             </a:fld>
             <a:endParaRPr lang="en-US" dirty="0"/>
           </a:p>
@@ -4024,7 +4016,7 @@
           <a:p>
             <a:fld id="{E69A4D3A-6EF8-7448-AC6F-AD52FEDAA6A8}" type="datetimeFigureOut">
               <a:rPr lang="en-US" smtClean="0"/>
-              <a:t>3/17/21</a:t>
+              <a:t>4/5/21</a:t>
             </a:fld>
             <a:endParaRPr lang="en-US" dirty="0"/>
           </a:p>
@@ -4443,7 +4435,7 @@
           <a:p>
             <a:fld id="{E69A4D3A-6EF8-7448-AC6F-AD52FEDAA6A8}" type="datetimeFigureOut">
               <a:rPr lang="en-US" smtClean="0"/>
-              <a:t>3/17/21</a:t>
+              <a:t>4/5/21</a:t>
             </a:fld>
             <a:endParaRPr lang="en-US" dirty="0"/>
           </a:p>
@@ -4560,7 +4552,7 @@
           <a:p>
             <a:fld id="{E69A4D3A-6EF8-7448-AC6F-AD52FEDAA6A8}" type="datetimeFigureOut">
               <a:rPr lang="en-US" smtClean="0"/>
-              <a:t>3/17/21</a:t>
+              <a:t>4/5/21</a:t>
             </a:fld>
             <a:endParaRPr lang="en-US" dirty="0"/>
           </a:p>
@@ -4655,7 +4647,7 @@
           <a:p>
             <a:fld id="{E69A4D3A-6EF8-7448-AC6F-AD52FEDAA6A8}" type="datetimeFigureOut">
               <a:rPr lang="en-US" smtClean="0"/>
-              <a:t>3/17/21</a:t>
+              <a:t>4/5/21</a:t>
             </a:fld>
             <a:endParaRPr lang="en-US" dirty="0"/>
           </a:p>
@@ -4930,7 +4922,7 @@
           <a:p>
             <a:fld id="{E69A4D3A-6EF8-7448-AC6F-AD52FEDAA6A8}" type="datetimeFigureOut">
               <a:rPr lang="en-US" smtClean="0"/>
-              <a:t>3/17/21</a:t>
+              <a:t>4/5/21</a:t>
             </a:fld>
             <a:endParaRPr lang="en-US" dirty="0"/>
           </a:p>
@@ -5185,7 +5177,7 @@
           <a:p>
             <a:fld id="{E69A4D3A-6EF8-7448-AC6F-AD52FEDAA6A8}" type="datetimeFigureOut">
               <a:rPr lang="en-US" smtClean="0"/>
-              <a:t>3/17/21</a:t>
+              <a:t>4/5/21</a:t>
             </a:fld>
             <a:endParaRPr lang="en-US" dirty="0"/>
           </a:p>
@@ -5399,7 +5391,7 @@
           <a:p>
             <a:fld id="{E69A4D3A-6EF8-7448-AC6F-AD52FEDAA6A8}" type="datetimeFigureOut">
               <a:rPr lang="en-US" smtClean="0"/>
-              <a:t>3/17/21</a:t>
+              <a:t>4/5/21</a:t>
             </a:fld>
             <a:endParaRPr lang="en-US" dirty="0"/>
           </a:p>
@@ -7151,7 +7143,7 @@
             </a:pPr>
             <a:r>
               <a:rPr lang="en-US" dirty="0"/>
-              <a:t>In this task, you will see a series of pictures in sets of four. After each set of images, you will be asked to respond to five questions:</a:t>
+              <a:t>In this task, you will see a series of pictures. After each image, you will be asked to respond to five questions:</a:t>
             </a:r>
           </a:p>
           <a:p>
@@ -7172,7 +7164,7 @@
               <a:rPr lang="en-US" sz="2400" dirty="0">
                 <a:cs typeface="Calibri"/>
               </a:rPr>
-              <a:t>Are these pictures related to your identity as a native person? (Y/N)</a:t>
+              <a:t>Is this picture related to your identity as a native person? (Y/N)</a:t>
             </a:r>
           </a:p>
           <a:p>
@@ -7193,7 +7185,7 @@
               <a:rPr lang="en-US" sz="2400" dirty="0">
                 <a:cs typeface="Calibri"/>
               </a:rPr>
-              <a:t>How much did these pictures relate to your identity as a native person? (0-100)</a:t>
+              <a:t>How much did this picture relate to your identity as a native person? (0-100)</a:t>
             </a:r>
           </a:p>
           <a:p>
@@ -7235,7 +7227,7 @@
               <a:rPr lang="en-US" sz="2400" dirty="0">
                 <a:cs typeface="Calibri"/>
               </a:rPr>
-              <a:t>Rate your mood in response to these pictures.             	               </a:t>
+              <a:t>Rate your mood in response to this picture.             	               </a:t>
             </a:r>
             <a:r>
               <a:rPr lang="en-US" sz="2000" dirty="0">
@@ -7262,7 +7254,7 @@
               <a:rPr lang="en-US" sz="2400" dirty="0">
                 <a:cs typeface="Calibri"/>
               </a:rPr>
-              <a:t>Rate your arousal in response to these pictures.         	               </a:t>
+              <a:t>Rate your arousal in response to this picture.         	               </a:t>
             </a:r>
             <a:r>
               <a:rPr lang="en-US" sz="2000" dirty="0">

</xml_diff>

<commit_message>
added ncair arousal only
</commit_message>
<xml_diff>
--- a/public/js/tasks/ncair/media/Ncair_Remote_Instructions.pptx
+++ b/public/js/tasks/ncair/media/Ncair_Remote_Instructions.pptx
@@ -5,7 +5,7 @@
     <p:sldMasterId id="2147483660" r:id="rId1"/>
   </p:sldMasterIdLst>
   <p:notesMasterIdLst>
-    <p:notesMasterId r:id="rId27"/>
+    <p:notesMasterId r:id="rId33"/>
   </p:notesMasterIdLst>
   <p:sldIdLst>
     <p:sldId id="498" r:id="rId2"/>
@@ -33,6 +33,12 @@
     <p:sldId id="562" r:id="rId24"/>
     <p:sldId id="563" r:id="rId25"/>
     <p:sldId id="582" r:id="rId26"/>
+    <p:sldId id="585" r:id="rId27"/>
+    <p:sldId id="586" r:id="rId28"/>
+    <p:sldId id="587" r:id="rId29"/>
+    <p:sldId id="588" r:id="rId30"/>
+    <p:sldId id="589" r:id="rId31"/>
+    <p:sldId id="590" r:id="rId32"/>
   </p:sldIdLst>
   <p:sldSz cx="9144000" cy="6858000" type="screen4x3"/>
   <p:notesSz cx="6858000" cy="9144000"/>
@@ -132,6 +138,49 @@
     </a:lvl9pPr>
   </p:defaultTextStyle>
   <p:extLst>
+    <p:ext uri="{521415D9-36F7-43E2-AB2F-B90AF26B5E84}">
+      <p14:sectionLst xmlns:p14="http://schemas.microsoft.com/office/powerpoint/2010/main">
+        <p14:section name="NCAIR" id="{63682A8E-9564-9D49-AB26-79337CEEC670}">
+          <p14:sldIdLst>
+            <p14:sldId id="498"/>
+            <p14:sldId id="583"/>
+            <p14:sldId id="584"/>
+            <p14:sldId id="559"/>
+            <p14:sldId id="538"/>
+            <p14:sldId id="564"/>
+            <p14:sldId id="550"/>
+            <p14:sldId id="565"/>
+            <p14:sldId id="551"/>
+            <p14:sldId id="552"/>
+            <p14:sldId id="579"/>
+            <p14:sldId id="555"/>
+            <p14:sldId id="566"/>
+            <p14:sldId id="556"/>
+            <p14:sldId id="576"/>
+            <p14:sldId id="557"/>
+            <p14:sldId id="558"/>
+            <p14:sldId id="578"/>
+            <p14:sldId id="560"/>
+            <p14:sldId id="580"/>
+            <p14:sldId id="561"/>
+            <p14:sldId id="581"/>
+            <p14:sldId id="562"/>
+            <p14:sldId id="563"/>
+            <p14:sldId id="582"/>
+          </p14:sldIdLst>
+        </p14:section>
+        <p14:section name="NCAIR-Arousal" id="{DF7AC69D-DE86-504A-9707-12453AE158C4}">
+          <p14:sldIdLst>
+            <p14:sldId id="585"/>
+            <p14:sldId id="586"/>
+            <p14:sldId id="587"/>
+            <p14:sldId id="588"/>
+            <p14:sldId id="589"/>
+            <p14:sldId id="590"/>
+          </p14:sldIdLst>
+        </p14:section>
+      </p14:sectionLst>
+    </p:ext>
     <p:ext uri="{EFAFB233-063F-42B5-8137-9DF3F51BA10A}">
       <p15:sldGuideLst xmlns:p15="http://schemas.microsoft.com/office/powerpoint/2012/main">
         <p15:guide id="1" orient="horz" pos="2160">
@@ -232,7 +281,7 @@
           <a:p>
             <a:fld id="{5ACDFB13-8C7E-2148-B293-047F9641DD71}" type="datetimeFigureOut">
               <a:rPr lang="en-US" smtClean="0"/>
-              <a:t>4/5/21</a:t>
+              <a:t>6/21/21</a:t>
             </a:fld>
             <a:endParaRPr lang="en-US" dirty="0"/>
           </a:p>
@@ -2149,6 +2198,374 @@
 </p:notes>
 </file>
 
+<file path=ppt/notesSlides/notesSlide26.xml><?xml version="1.0" encoding="utf-8"?>
+<p:notes xmlns:a="http://schemas.openxmlformats.org/drawingml/2006/main" xmlns:r="http://schemas.openxmlformats.org/officeDocument/2006/relationships" xmlns:p="http://schemas.openxmlformats.org/presentationml/2006/main">
+  <p:cSld>
+    <p:spTree>
+      <p:nvGrpSpPr>
+        <p:cNvPr id="1" name=""/>
+        <p:cNvGrpSpPr/>
+        <p:nvPr/>
+      </p:nvGrpSpPr>
+      <p:grpSpPr>
+        <a:xfrm>
+          <a:off x="0" y="0"/>
+          <a:ext cx="0" cy="0"/>
+          <a:chOff x="0" y="0"/>
+          <a:chExt cx="0" cy="0"/>
+        </a:xfrm>
+      </p:grpSpPr>
+      <p:sp>
+        <p:nvSpPr>
+          <p:cNvPr id="2" name="Slide Image Placeholder 1"/>
+          <p:cNvSpPr>
+            <a:spLocks noGrp="1" noRot="1" noChangeAspect="1"/>
+          </p:cNvSpPr>
+          <p:nvPr>
+            <p:ph type="sldImg"/>
+          </p:nvPr>
+        </p:nvSpPr>
+        <p:spPr/>
+      </p:sp>
+      <p:sp>
+        <p:nvSpPr>
+          <p:cNvPr id="3" name="Notes Placeholder 2"/>
+          <p:cNvSpPr>
+            <a:spLocks noGrp="1"/>
+          </p:cNvSpPr>
+          <p:nvPr>
+            <p:ph type="body" idx="1"/>
+          </p:nvPr>
+        </p:nvSpPr>
+        <p:spPr/>
+        <p:txBody>
+          <a:bodyPr/>
+          <a:lstStyle/>
+          <a:p>
+            <a:r>
+              <a:rPr lang="en-US" dirty="0"/>
+              <a:t>Outside</a:t>
+            </a:r>
+            <a:r>
+              <a:rPr lang="en-US" baseline="0" dirty="0"/>
+              <a:t> the scanner</a:t>
+            </a:r>
+            <a:endParaRPr lang="en-US" dirty="0"/>
+          </a:p>
+        </p:txBody>
+      </p:sp>
+      <p:sp>
+        <p:nvSpPr>
+          <p:cNvPr id="4" name="Slide Number Placeholder 3"/>
+          <p:cNvSpPr>
+            <a:spLocks noGrp="1"/>
+          </p:cNvSpPr>
+          <p:nvPr>
+            <p:ph type="sldNum" sz="quarter" idx="10"/>
+          </p:nvPr>
+        </p:nvSpPr>
+        <p:spPr/>
+        <p:txBody>
+          <a:bodyPr/>
+          <a:lstStyle/>
+          <a:p>
+            <a:fld id="{BCAE12D7-AE97-9243-8341-9A20FCA5A307}" type="slidenum">
+              <a:rPr lang="en-US" smtClean="0"/>
+              <a:t>26</a:t>
+            </a:fld>
+            <a:endParaRPr lang="en-US"/>
+          </a:p>
+        </p:txBody>
+      </p:sp>
+    </p:spTree>
+    <p:extLst>
+      <p:ext uri="{BB962C8B-B14F-4D97-AF65-F5344CB8AC3E}">
+        <p14:creationId xmlns:p14="http://schemas.microsoft.com/office/powerpoint/2010/main" val="1993544261"/>
+      </p:ext>
+    </p:extLst>
+  </p:cSld>
+  <p:clrMapOvr>
+    <a:masterClrMapping/>
+  </p:clrMapOvr>
+</p:notes>
+</file>
+
+<file path=ppt/notesSlides/notesSlide27.xml><?xml version="1.0" encoding="utf-8"?>
+<p:notes xmlns:a="http://schemas.openxmlformats.org/drawingml/2006/main" xmlns:r="http://schemas.openxmlformats.org/officeDocument/2006/relationships" xmlns:p="http://schemas.openxmlformats.org/presentationml/2006/main">
+  <p:cSld>
+    <p:spTree>
+      <p:nvGrpSpPr>
+        <p:cNvPr id="1" name=""/>
+        <p:cNvGrpSpPr/>
+        <p:nvPr/>
+      </p:nvGrpSpPr>
+      <p:grpSpPr>
+        <a:xfrm>
+          <a:off x="0" y="0"/>
+          <a:ext cx="0" cy="0"/>
+          <a:chOff x="0" y="0"/>
+          <a:chExt cx="0" cy="0"/>
+        </a:xfrm>
+      </p:grpSpPr>
+      <p:sp>
+        <p:nvSpPr>
+          <p:cNvPr id="2" name="Slide Image Placeholder 1"/>
+          <p:cNvSpPr>
+            <a:spLocks noGrp="1" noRot="1" noChangeAspect="1"/>
+          </p:cNvSpPr>
+          <p:nvPr>
+            <p:ph type="sldImg"/>
+          </p:nvPr>
+        </p:nvSpPr>
+        <p:spPr/>
+      </p:sp>
+      <p:sp>
+        <p:nvSpPr>
+          <p:cNvPr id="3" name="Notes Placeholder 2"/>
+          <p:cNvSpPr>
+            <a:spLocks noGrp="1"/>
+          </p:cNvSpPr>
+          <p:nvPr>
+            <p:ph type="body" idx="1"/>
+          </p:nvPr>
+        </p:nvSpPr>
+        <p:spPr/>
+        <p:txBody>
+          <a:bodyPr/>
+          <a:lstStyle/>
+          <a:p>
+            <a:r>
+              <a:rPr lang="en-US" dirty="0"/>
+              <a:t>Outside</a:t>
+            </a:r>
+            <a:r>
+              <a:rPr lang="en-US" baseline="0" dirty="0"/>
+              <a:t> the scanner</a:t>
+            </a:r>
+            <a:endParaRPr lang="en-US" dirty="0"/>
+          </a:p>
+        </p:txBody>
+      </p:sp>
+      <p:sp>
+        <p:nvSpPr>
+          <p:cNvPr id="4" name="Slide Number Placeholder 3"/>
+          <p:cNvSpPr>
+            <a:spLocks noGrp="1"/>
+          </p:cNvSpPr>
+          <p:nvPr>
+            <p:ph type="sldNum" sz="quarter" idx="10"/>
+          </p:nvPr>
+        </p:nvSpPr>
+        <p:spPr/>
+        <p:txBody>
+          <a:bodyPr/>
+          <a:lstStyle/>
+          <a:p>
+            <a:fld id="{BCAE12D7-AE97-9243-8341-9A20FCA5A307}" type="slidenum">
+              <a:rPr lang="en-US" smtClean="0"/>
+              <a:t>27</a:t>
+            </a:fld>
+            <a:endParaRPr lang="en-US"/>
+          </a:p>
+        </p:txBody>
+      </p:sp>
+    </p:spTree>
+    <p:extLst>
+      <p:ext uri="{BB962C8B-B14F-4D97-AF65-F5344CB8AC3E}">
+        <p14:creationId xmlns:p14="http://schemas.microsoft.com/office/powerpoint/2010/main" val="26743622"/>
+      </p:ext>
+    </p:extLst>
+  </p:cSld>
+  <p:clrMapOvr>
+    <a:masterClrMapping/>
+  </p:clrMapOvr>
+</p:notes>
+</file>
+
+<file path=ppt/notesSlides/notesSlide28.xml><?xml version="1.0" encoding="utf-8"?>
+<p:notes xmlns:a="http://schemas.openxmlformats.org/drawingml/2006/main" xmlns:r="http://schemas.openxmlformats.org/officeDocument/2006/relationships" xmlns:p="http://schemas.openxmlformats.org/presentationml/2006/main">
+  <p:cSld>
+    <p:spTree>
+      <p:nvGrpSpPr>
+        <p:cNvPr id="1" name=""/>
+        <p:cNvGrpSpPr/>
+        <p:nvPr/>
+      </p:nvGrpSpPr>
+      <p:grpSpPr>
+        <a:xfrm>
+          <a:off x="0" y="0"/>
+          <a:ext cx="0" cy="0"/>
+          <a:chOff x="0" y="0"/>
+          <a:chExt cx="0" cy="0"/>
+        </a:xfrm>
+      </p:grpSpPr>
+      <p:sp>
+        <p:nvSpPr>
+          <p:cNvPr id="2" name="Slide Image Placeholder 1"/>
+          <p:cNvSpPr>
+            <a:spLocks noGrp="1" noRot="1" noChangeAspect="1"/>
+          </p:cNvSpPr>
+          <p:nvPr>
+            <p:ph type="sldImg"/>
+          </p:nvPr>
+        </p:nvSpPr>
+        <p:spPr/>
+      </p:sp>
+      <p:sp>
+        <p:nvSpPr>
+          <p:cNvPr id="3" name="Notes Placeholder 2"/>
+          <p:cNvSpPr>
+            <a:spLocks noGrp="1"/>
+          </p:cNvSpPr>
+          <p:nvPr>
+            <p:ph type="body" idx="1"/>
+          </p:nvPr>
+        </p:nvSpPr>
+        <p:spPr/>
+        <p:txBody>
+          <a:bodyPr/>
+          <a:lstStyle/>
+          <a:p>
+            <a:r>
+              <a:rPr lang="en-US" dirty="0"/>
+              <a:t>Outside</a:t>
+            </a:r>
+            <a:r>
+              <a:rPr lang="en-US" baseline="0" dirty="0"/>
+              <a:t> the scanner</a:t>
+            </a:r>
+            <a:endParaRPr lang="en-US" dirty="0"/>
+          </a:p>
+        </p:txBody>
+      </p:sp>
+      <p:sp>
+        <p:nvSpPr>
+          <p:cNvPr id="4" name="Slide Number Placeholder 3"/>
+          <p:cNvSpPr>
+            <a:spLocks noGrp="1"/>
+          </p:cNvSpPr>
+          <p:nvPr>
+            <p:ph type="sldNum" sz="quarter" idx="10"/>
+          </p:nvPr>
+        </p:nvSpPr>
+        <p:spPr/>
+        <p:txBody>
+          <a:bodyPr/>
+          <a:lstStyle/>
+          <a:p>
+            <a:fld id="{BCAE12D7-AE97-9243-8341-9A20FCA5A307}" type="slidenum">
+              <a:rPr lang="en-US" smtClean="0"/>
+              <a:t>28</a:t>
+            </a:fld>
+            <a:endParaRPr lang="en-US"/>
+          </a:p>
+        </p:txBody>
+      </p:sp>
+    </p:spTree>
+    <p:extLst>
+      <p:ext uri="{BB962C8B-B14F-4D97-AF65-F5344CB8AC3E}">
+        <p14:creationId xmlns:p14="http://schemas.microsoft.com/office/powerpoint/2010/main" val="1302468741"/>
+      </p:ext>
+    </p:extLst>
+  </p:cSld>
+  <p:clrMapOvr>
+    <a:masterClrMapping/>
+  </p:clrMapOvr>
+</p:notes>
+</file>
+
+<file path=ppt/notesSlides/notesSlide29.xml><?xml version="1.0" encoding="utf-8"?>
+<p:notes xmlns:a="http://schemas.openxmlformats.org/drawingml/2006/main" xmlns:r="http://schemas.openxmlformats.org/officeDocument/2006/relationships" xmlns:p="http://schemas.openxmlformats.org/presentationml/2006/main">
+  <p:cSld>
+    <p:spTree>
+      <p:nvGrpSpPr>
+        <p:cNvPr id="1" name=""/>
+        <p:cNvGrpSpPr/>
+        <p:nvPr/>
+      </p:nvGrpSpPr>
+      <p:grpSpPr>
+        <a:xfrm>
+          <a:off x="0" y="0"/>
+          <a:ext cx="0" cy="0"/>
+          <a:chOff x="0" y="0"/>
+          <a:chExt cx="0" cy="0"/>
+        </a:xfrm>
+      </p:grpSpPr>
+      <p:sp>
+        <p:nvSpPr>
+          <p:cNvPr id="2" name="Slide Image Placeholder 1"/>
+          <p:cNvSpPr>
+            <a:spLocks noGrp="1" noRot="1" noChangeAspect="1"/>
+          </p:cNvSpPr>
+          <p:nvPr>
+            <p:ph type="sldImg"/>
+          </p:nvPr>
+        </p:nvSpPr>
+        <p:spPr/>
+      </p:sp>
+      <p:sp>
+        <p:nvSpPr>
+          <p:cNvPr id="3" name="Notes Placeholder 2"/>
+          <p:cNvSpPr>
+            <a:spLocks noGrp="1"/>
+          </p:cNvSpPr>
+          <p:nvPr>
+            <p:ph type="body" idx="1"/>
+          </p:nvPr>
+        </p:nvSpPr>
+        <p:spPr/>
+        <p:txBody>
+          <a:bodyPr/>
+          <a:lstStyle/>
+          <a:p>
+            <a:r>
+              <a:rPr lang="en-US" dirty="0"/>
+              <a:t>Add screenshots of an X and an O</a:t>
+            </a:r>
+            <a:r>
+              <a:rPr lang="en-US" baseline="0" dirty="0"/>
+              <a:t> screen – like a timeline of screenshots.</a:t>
+            </a:r>
+            <a:endParaRPr lang="en-US" dirty="0"/>
+          </a:p>
+        </p:txBody>
+      </p:sp>
+      <p:sp>
+        <p:nvSpPr>
+          <p:cNvPr id="4" name="Slide Number Placeholder 3"/>
+          <p:cNvSpPr>
+            <a:spLocks noGrp="1"/>
+          </p:cNvSpPr>
+          <p:nvPr>
+            <p:ph type="sldNum" sz="quarter" idx="10"/>
+          </p:nvPr>
+        </p:nvSpPr>
+        <p:spPr/>
+        <p:txBody>
+          <a:bodyPr/>
+          <a:lstStyle/>
+          <a:p>
+            <a:fld id="{BCAE12D7-AE97-9243-8341-9A20FCA5A307}" type="slidenum">
+              <a:rPr lang="en-US" smtClean="0"/>
+              <a:t>29</a:t>
+            </a:fld>
+            <a:endParaRPr lang="en-US"/>
+          </a:p>
+        </p:txBody>
+      </p:sp>
+    </p:spTree>
+    <p:extLst>
+      <p:ext uri="{BB962C8B-B14F-4D97-AF65-F5344CB8AC3E}">
+        <p14:creationId xmlns:p14="http://schemas.microsoft.com/office/powerpoint/2010/main" val="2213703683"/>
+      </p:ext>
+    </p:extLst>
+  </p:cSld>
+  <p:clrMapOvr>
+    <a:masterClrMapping/>
+  </p:clrMapOvr>
+</p:notes>
+</file>
+
 <file path=ppt/notesSlides/notesSlide3.xml><?xml version="1.0" encoding="utf-8"?>
 <p:notes xmlns:a="http://schemas.openxmlformats.org/drawingml/2006/main" xmlns:r="http://schemas.openxmlformats.org/officeDocument/2006/relationships" xmlns:p="http://schemas.openxmlformats.org/presentationml/2006/main">
   <p:cSld>
@@ -2232,6 +2649,177 @@
     <p:extLst>
       <p:ext uri="{BB962C8B-B14F-4D97-AF65-F5344CB8AC3E}">
         <p14:creationId xmlns:p14="http://schemas.microsoft.com/office/powerpoint/2010/main" val="504319213"/>
+      </p:ext>
+    </p:extLst>
+  </p:cSld>
+  <p:clrMapOvr>
+    <a:masterClrMapping/>
+  </p:clrMapOvr>
+</p:notes>
+</file>
+
+<file path=ppt/notesSlides/notesSlide30.xml><?xml version="1.0" encoding="utf-8"?>
+<p:notes xmlns:a="http://schemas.openxmlformats.org/drawingml/2006/main" xmlns:r="http://schemas.openxmlformats.org/officeDocument/2006/relationships" xmlns:p="http://schemas.openxmlformats.org/presentationml/2006/main">
+  <p:cSld>
+    <p:spTree>
+      <p:nvGrpSpPr>
+        <p:cNvPr id="1" name=""/>
+        <p:cNvGrpSpPr/>
+        <p:nvPr/>
+      </p:nvGrpSpPr>
+      <p:grpSpPr>
+        <a:xfrm>
+          <a:off x="0" y="0"/>
+          <a:ext cx="0" cy="0"/>
+          <a:chOff x="0" y="0"/>
+          <a:chExt cx="0" cy="0"/>
+        </a:xfrm>
+      </p:grpSpPr>
+      <p:sp>
+        <p:nvSpPr>
+          <p:cNvPr id="2" name="Slide Image Placeholder 1"/>
+          <p:cNvSpPr>
+            <a:spLocks noGrp="1" noRot="1" noChangeAspect="1"/>
+          </p:cNvSpPr>
+          <p:nvPr>
+            <p:ph type="sldImg"/>
+          </p:nvPr>
+        </p:nvSpPr>
+        <p:spPr/>
+      </p:sp>
+      <p:sp>
+        <p:nvSpPr>
+          <p:cNvPr id="3" name="Notes Placeholder 2"/>
+          <p:cNvSpPr>
+            <a:spLocks noGrp="1"/>
+          </p:cNvSpPr>
+          <p:nvPr>
+            <p:ph type="body" idx="1"/>
+          </p:nvPr>
+        </p:nvSpPr>
+        <p:spPr/>
+        <p:txBody>
+          <a:bodyPr/>
+          <a:lstStyle/>
+          <a:p>
+            <a:endParaRPr lang="en-US" dirty="0"/>
+          </a:p>
+        </p:txBody>
+      </p:sp>
+      <p:sp>
+        <p:nvSpPr>
+          <p:cNvPr id="4" name="Slide Number Placeholder 3"/>
+          <p:cNvSpPr>
+            <a:spLocks noGrp="1"/>
+          </p:cNvSpPr>
+          <p:nvPr>
+            <p:ph type="sldNum" sz="quarter" idx="10"/>
+          </p:nvPr>
+        </p:nvSpPr>
+        <p:spPr/>
+        <p:txBody>
+          <a:bodyPr/>
+          <a:lstStyle/>
+          <a:p>
+            <a:fld id="{BCAE12D7-AE97-9243-8341-9A20FCA5A307}" type="slidenum">
+              <a:rPr lang="en-US" smtClean="0"/>
+              <a:t>30</a:t>
+            </a:fld>
+            <a:endParaRPr lang="en-US"/>
+          </a:p>
+        </p:txBody>
+      </p:sp>
+    </p:spTree>
+    <p:extLst>
+      <p:ext uri="{BB962C8B-B14F-4D97-AF65-F5344CB8AC3E}">
+        <p14:creationId xmlns:p14="http://schemas.microsoft.com/office/powerpoint/2010/main" val="3323543944"/>
+      </p:ext>
+    </p:extLst>
+  </p:cSld>
+  <p:clrMapOvr>
+    <a:masterClrMapping/>
+  </p:clrMapOvr>
+</p:notes>
+</file>
+
+<file path=ppt/notesSlides/notesSlide31.xml><?xml version="1.0" encoding="utf-8"?>
+<p:notes xmlns:a="http://schemas.openxmlformats.org/drawingml/2006/main" xmlns:r="http://schemas.openxmlformats.org/officeDocument/2006/relationships" xmlns:p="http://schemas.openxmlformats.org/presentationml/2006/main">
+  <p:cSld>
+    <p:spTree>
+      <p:nvGrpSpPr>
+        <p:cNvPr id="1" name=""/>
+        <p:cNvGrpSpPr/>
+        <p:nvPr/>
+      </p:nvGrpSpPr>
+      <p:grpSpPr>
+        <a:xfrm>
+          <a:off x="0" y="0"/>
+          <a:ext cx="0" cy="0"/>
+          <a:chOff x="0" y="0"/>
+          <a:chExt cx="0" cy="0"/>
+        </a:xfrm>
+      </p:grpSpPr>
+      <p:sp>
+        <p:nvSpPr>
+          <p:cNvPr id="2" name="Slide Image Placeholder 1"/>
+          <p:cNvSpPr>
+            <a:spLocks noGrp="1" noRot="1" noChangeAspect="1"/>
+          </p:cNvSpPr>
+          <p:nvPr>
+            <p:ph type="sldImg"/>
+          </p:nvPr>
+        </p:nvSpPr>
+        <p:spPr/>
+      </p:sp>
+      <p:sp>
+        <p:nvSpPr>
+          <p:cNvPr id="3" name="Notes Placeholder 2"/>
+          <p:cNvSpPr>
+            <a:spLocks noGrp="1"/>
+          </p:cNvSpPr>
+          <p:nvPr>
+            <p:ph type="body" idx="1"/>
+          </p:nvPr>
+        </p:nvSpPr>
+        <p:spPr/>
+        <p:txBody>
+          <a:bodyPr/>
+          <a:lstStyle/>
+          <a:p>
+            <a:r>
+              <a:rPr lang="en-US" dirty="0"/>
+              <a:t>Audi Run</a:t>
+            </a:r>
+          </a:p>
+        </p:txBody>
+      </p:sp>
+      <p:sp>
+        <p:nvSpPr>
+          <p:cNvPr id="4" name="Slide Number Placeholder 3"/>
+          <p:cNvSpPr>
+            <a:spLocks noGrp="1"/>
+          </p:cNvSpPr>
+          <p:nvPr>
+            <p:ph type="sldNum" sz="quarter" idx="10"/>
+          </p:nvPr>
+        </p:nvSpPr>
+        <p:spPr/>
+        <p:txBody>
+          <a:bodyPr/>
+          <a:lstStyle/>
+          <a:p>
+            <a:fld id="{BCAE12D7-AE97-9243-8341-9A20FCA5A307}" type="slidenum">
+              <a:rPr lang="en-US" smtClean="0"/>
+              <a:t>31</a:t>
+            </a:fld>
+            <a:endParaRPr lang="en-US"/>
+          </a:p>
+        </p:txBody>
+      </p:sp>
+    </p:spTree>
+    <p:extLst>
+      <p:ext uri="{BB962C8B-B14F-4D97-AF65-F5344CB8AC3E}">
+        <p14:creationId xmlns:p14="http://schemas.microsoft.com/office/powerpoint/2010/main" val="1813674064"/>
       </p:ext>
     </p:extLst>
   </p:cSld>
@@ -2972,7 +3560,7 @@
           <a:p>
             <a:fld id="{E69A4D3A-6EF8-7448-AC6F-AD52FEDAA6A8}" type="datetimeFigureOut">
               <a:rPr lang="en-US" smtClean="0"/>
-              <a:t>4/5/21</a:t>
+              <a:t>6/21/21</a:t>
             </a:fld>
             <a:endParaRPr lang="en-US" dirty="0"/>
           </a:p>
@@ -3140,7 +3728,7 @@
           <a:p>
             <a:fld id="{E69A4D3A-6EF8-7448-AC6F-AD52FEDAA6A8}" type="datetimeFigureOut">
               <a:rPr lang="en-US" smtClean="0"/>
-              <a:t>4/5/21</a:t>
+              <a:t>6/21/21</a:t>
             </a:fld>
             <a:endParaRPr lang="en-US" dirty="0"/>
           </a:p>
@@ -3318,7 +3906,7 @@
           <a:p>
             <a:fld id="{E69A4D3A-6EF8-7448-AC6F-AD52FEDAA6A8}" type="datetimeFigureOut">
               <a:rPr lang="en-US" smtClean="0"/>
-              <a:t>4/5/21</a:t>
+              <a:t>6/21/21</a:t>
             </a:fld>
             <a:endParaRPr lang="en-US" dirty="0"/>
           </a:p>
@@ -3486,7 +4074,7 @@
           <a:p>
             <a:fld id="{E69A4D3A-6EF8-7448-AC6F-AD52FEDAA6A8}" type="datetimeFigureOut">
               <a:rPr lang="en-US" smtClean="0"/>
-              <a:t>4/5/21</a:t>
+              <a:t>6/21/21</a:t>
             </a:fld>
             <a:endParaRPr lang="en-US" dirty="0"/>
           </a:p>
@@ -3731,7 +4319,7 @@
           <a:p>
             <a:fld id="{E69A4D3A-6EF8-7448-AC6F-AD52FEDAA6A8}" type="datetimeFigureOut">
               <a:rPr lang="en-US" smtClean="0"/>
-              <a:t>4/5/21</a:t>
+              <a:t>6/21/21</a:t>
             </a:fld>
             <a:endParaRPr lang="en-US" dirty="0"/>
           </a:p>
@@ -4016,7 +4604,7 @@
           <a:p>
             <a:fld id="{E69A4D3A-6EF8-7448-AC6F-AD52FEDAA6A8}" type="datetimeFigureOut">
               <a:rPr lang="en-US" smtClean="0"/>
-              <a:t>4/5/21</a:t>
+              <a:t>6/21/21</a:t>
             </a:fld>
             <a:endParaRPr lang="en-US" dirty="0"/>
           </a:p>
@@ -4435,7 +5023,7 @@
           <a:p>
             <a:fld id="{E69A4D3A-6EF8-7448-AC6F-AD52FEDAA6A8}" type="datetimeFigureOut">
               <a:rPr lang="en-US" smtClean="0"/>
-              <a:t>4/5/21</a:t>
+              <a:t>6/21/21</a:t>
             </a:fld>
             <a:endParaRPr lang="en-US" dirty="0"/>
           </a:p>
@@ -4552,7 +5140,7 @@
           <a:p>
             <a:fld id="{E69A4D3A-6EF8-7448-AC6F-AD52FEDAA6A8}" type="datetimeFigureOut">
               <a:rPr lang="en-US" smtClean="0"/>
-              <a:t>4/5/21</a:t>
+              <a:t>6/21/21</a:t>
             </a:fld>
             <a:endParaRPr lang="en-US" dirty="0"/>
           </a:p>
@@ -4647,7 +5235,7 @@
           <a:p>
             <a:fld id="{E69A4D3A-6EF8-7448-AC6F-AD52FEDAA6A8}" type="datetimeFigureOut">
               <a:rPr lang="en-US" smtClean="0"/>
-              <a:t>4/5/21</a:t>
+              <a:t>6/21/21</a:t>
             </a:fld>
             <a:endParaRPr lang="en-US" dirty="0"/>
           </a:p>
@@ -4922,7 +5510,7 @@
           <a:p>
             <a:fld id="{E69A4D3A-6EF8-7448-AC6F-AD52FEDAA6A8}" type="datetimeFigureOut">
               <a:rPr lang="en-US" smtClean="0"/>
-              <a:t>4/5/21</a:t>
+              <a:t>6/21/21</a:t>
             </a:fld>
             <a:endParaRPr lang="en-US" dirty="0"/>
           </a:p>
@@ -5177,7 +5765,7 @@
           <a:p>
             <a:fld id="{E69A4D3A-6EF8-7448-AC6F-AD52FEDAA6A8}" type="datetimeFigureOut">
               <a:rPr lang="en-US" smtClean="0"/>
-              <a:t>4/5/21</a:t>
+              <a:t>6/21/21</a:t>
             </a:fld>
             <a:endParaRPr lang="en-US" dirty="0"/>
           </a:p>
@@ -5391,7 +5979,7 @@
           <a:p>
             <a:fld id="{E69A4D3A-6EF8-7448-AC6F-AD52FEDAA6A8}" type="datetimeFigureOut">
               <a:rPr lang="en-US" smtClean="0"/>
-              <a:t>4/5/21</a:t>
+              <a:t>6/21/21</a:t>
             </a:fld>
             <a:endParaRPr lang="en-US" dirty="0"/>
           </a:p>
@@ -7688,7 +8276,7 @@
 </file>
 
 <file path=ppt/slides/slide20.xml><?xml version="1.0" encoding="utf-8"?>
-<p:sld xmlns:a="http://schemas.openxmlformats.org/drawingml/2006/main" xmlns:r="http://schemas.openxmlformats.org/officeDocument/2006/relationships" xmlns:p="http://schemas.openxmlformats.org/presentationml/2006/main">
+<p:sld xmlns:a="http://schemas.openxmlformats.org/drawingml/2006/main" xmlns:r="http://schemas.openxmlformats.org/officeDocument/2006/relationships" xmlns:p="http://schemas.openxmlformats.org/presentationml/2006/main" show="0">
   <p:cSld>
     <p:spTree>
       <p:nvGrpSpPr>
@@ -7806,7 +8394,7 @@
 </file>
 
 <file path=ppt/slides/slide21.xml><?xml version="1.0" encoding="utf-8"?>
-<p:sld xmlns:a="http://schemas.openxmlformats.org/drawingml/2006/main" xmlns:r="http://schemas.openxmlformats.org/officeDocument/2006/relationships" xmlns:p="http://schemas.openxmlformats.org/presentationml/2006/main">
+<p:sld xmlns:a="http://schemas.openxmlformats.org/drawingml/2006/main" xmlns:r="http://schemas.openxmlformats.org/officeDocument/2006/relationships" xmlns:p="http://schemas.openxmlformats.org/presentationml/2006/main" show="0">
   <p:cSld>
     <p:spTree>
       <p:nvGrpSpPr>
@@ -7933,7 +8521,7 @@
 </file>
 
 <file path=ppt/slides/slide22.xml><?xml version="1.0" encoding="utf-8"?>
-<p:sld xmlns:a="http://schemas.openxmlformats.org/drawingml/2006/main" xmlns:r="http://schemas.openxmlformats.org/officeDocument/2006/relationships" xmlns:p="http://schemas.openxmlformats.org/presentationml/2006/main">
+<p:sld xmlns:a="http://schemas.openxmlformats.org/drawingml/2006/main" xmlns:r="http://schemas.openxmlformats.org/officeDocument/2006/relationships" xmlns:p="http://schemas.openxmlformats.org/presentationml/2006/main" show="0">
   <p:cSld>
     <p:spTree>
       <p:nvGrpSpPr>
@@ -8060,7 +8648,7 @@
 </file>
 
 <file path=ppt/slides/slide23.xml><?xml version="1.0" encoding="utf-8"?>
-<p:sld xmlns:a="http://schemas.openxmlformats.org/drawingml/2006/main" xmlns:r="http://schemas.openxmlformats.org/officeDocument/2006/relationships" xmlns:p="http://schemas.openxmlformats.org/presentationml/2006/main">
+<p:sld xmlns:a="http://schemas.openxmlformats.org/drawingml/2006/main" xmlns:r="http://schemas.openxmlformats.org/officeDocument/2006/relationships" xmlns:p="http://schemas.openxmlformats.org/presentationml/2006/main" show="0">
   <p:cSld>
     <p:spTree>
       <p:nvGrpSpPr>
@@ -8192,7 +8780,7 @@
 </file>
 
 <file path=ppt/slides/slide24.xml><?xml version="1.0" encoding="utf-8"?>
-<p:sld xmlns:a="http://schemas.openxmlformats.org/drawingml/2006/main" xmlns:r="http://schemas.openxmlformats.org/officeDocument/2006/relationships" xmlns:p="http://schemas.openxmlformats.org/presentationml/2006/main">
+<p:sld xmlns:a="http://schemas.openxmlformats.org/drawingml/2006/main" xmlns:r="http://schemas.openxmlformats.org/officeDocument/2006/relationships" xmlns:p="http://schemas.openxmlformats.org/presentationml/2006/main" show="0">
   <p:cSld>
     <p:spTree>
       <p:nvGrpSpPr>
@@ -8460,7 +9048,7 @@
 </p:sld>
 </file>
 
-<file path=ppt/slides/slide3.xml><?xml version="1.0" encoding="utf-8"?>
+<file path=ppt/slides/slide26.xml><?xml version="1.0" encoding="utf-8"?>
 <p:sld xmlns:a="http://schemas.openxmlformats.org/drawingml/2006/main" xmlns:r="http://schemas.openxmlformats.org/officeDocument/2006/relationships" xmlns:p="http://schemas.openxmlformats.org/presentationml/2006/main">
   <p:cSld>
     <p:spTree>
@@ -8656,6 +9244,956 @@
         </p:nvSpPr>
         <p:spPr>
           <a:xfrm>
+            <a:off x="3339790" y="5160269"/>
+            <a:ext cx="2464420" cy="830997"/>
+          </a:xfrm>
+          <a:prstGeom prst="rect">
+            <a:avLst/>
+          </a:prstGeom>
+          <a:noFill/>
+        </p:spPr>
+        <p:txBody>
+          <a:bodyPr wrap="square" rtlCol="0">
+            <a:spAutoFit/>
+          </a:bodyPr>
+          <a:lstStyle/>
+          <a:p>
+            <a:pPr algn="ctr"/>
+            <a:r>
+              <a:rPr lang="en-US" sz="2400" dirty="0"/>
+              <a:t>A</a:t>
+            </a:r>
+          </a:p>
+          <a:p>
+            <a:pPr algn="ctr"/>
+            <a:r>
+              <a:rPr lang="en-US" sz="2400" dirty="0"/>
+              <a:t>Run 1</a:t>
+            </a:r>
+          </a:p>
+        </p:txBody>
+      </p:sp>
+    </p:spTree>
+    <p:extLst>
+      <p:ext uri="{BB962C8B-B14F-4D97-AF65-F5344CB8AC3E}">
+        <p14:creationId xmlns:p14="http://schemas.microsoft.com/office/powerpoint/2010/main" val="2174647272"/>
+      </p:ext>
+    </p:extLst>
+  </p:cSld>
+  <p:clrMapOvr>
+    <a:masterClrMapping/>
+  </p:clrMapOvr>
+</p:sld>
+</file>
+
+<file path=ppt/slides/slide27.xml><?xml version="1.0" encoding="utf-8"?>
+<p:sld xmlns:a="http://schemas.openxmlformats.org/drawingml/2006/main" xmlns:r="http://schemas.openxmlformats.org/officeDocument/2006/relationships" xmlns:p="http://schemas.openxmlformats.org/presentationml/2006/main">
+  <p:cSld>
+    <p:spTree>
+      <p:nvGrpSpPr>
+        <p:cNvPr id="1" name=""/>
+        <p:cNvGrpSpPr/>
+        <p:nvPr/>
+      </p:nvGrpSpPr>
+      <p:grpSpPr>
+        <a:xfrm>
+          <a:off x="0" y="0"/>
+          <a:ext cx="0" cy="0"/>
+          <a:chOff x="0" y="0"/>
+          <a:chExt cx="0" cy="0"/>
+        </a:xfrm>
+      </p:grpSpPr>
+      <p:sp>
+        <p:nvSpPr>
+          <p:cNvPr id="4" name="Title 3"/>
+          <p:cNvSpPr>
+            <a:spLocks noGrp="1"/>
+          </p:cNvSpPr>
+          <p:nvPr>
+            <p:ph type="ctrTitle"/>
+          </p:nvPr>
+        </p:nvSpPr>
+        <p:spPr>
+          <a:xfrm>
+            <a:off x="364343" y="2130425"/>
+            <a:ext cx="8458200" cy="1470025"/>
+          </a:xfrm>
+        </p:spPr>
+        <p:txBody>
+          <a:bodyPr>
+            <a:normAutofit/>
+          </a:bodyPr>
+          <a:lstStyle/>
+          <a:p>
+            <a:r>
+              <a:rPr lang="en-US" dirty="0"/>
+              <a:t>NCAIR Remote Stimulus Task</a:t>
+            </a:r>
+          </a:p>
+        </p:txBody>
+      </p:sp>
+      <p:pic>
+        <p:nvPicPr>
+          <p:cNvPr id="9" name="Picture 8"/>
+          <p:cNvPicPr>
+            <a:picLocks noChangeAspect="1"/>
+          </p:cNvPicPr>
+          <p:nvPr/>
+        </p:nvPicPr>
+        <p:blipFill>
+          <a:blip r:embed="rId3">
+            <a:extLst>
+              <a:ext uri="{28A0092B-C50C-407E-A947-70E740481C1C}">
+                <a14:useLocalDpi xmlns:a14="http://schemas.microsoft.com/office/drawing/2010/main" val="0"/>
+              </a:ext>
+            </a:extLst>
+          </a:blip>
+          <a:stretch>
+            <a:fillRect/>
+          </a:stretch>
+        </p:blipFill>
+        <p:spPr>
+          <a:xfrm>
+            <a:off x="7061982" y="236743"/>
+            <a:ext cx="1760561" cy="333863"/>
+          </a:xfrm>
+          <a:prstGeom prst="rect">
+            <a:avLst/>
+          </a:prstGeom>
+        </p:spPr>
+      </p:pic>
+      <p:sp>
+        <p:nvSpPr>
+          <p:cNvPr id="2" name="Title 3">
+            <a:extLst>
+              <a:ext uri="{FF2B5EF4-FFF2-40B4-BE49-F238E27FC236}">
+                <a16:creationId xmlns:a16="http://schemas.microsoft.com/office/drawing/2014/main" id="{A9CEA40B-5234-42D7-930C-3D1F04A17646}"/>
+              </a:ext>
+            </a:extLst>
+          </p:cNvPr>
+          <p:cNvSpPr txBox="1">
+            <a:spLocks/>
+          </p:cNvSpPr>
+          <p:nvPr/>
+        </p:nvSpPr>
+        <p:spPr>
+          <a:xfrm>
+            <a:off x="18856" y="6208354"/>
+            <a:ext cx="9149174" cy="656705"/>
+          </a:xfrm>
+          <a:prstGeom prst="rect">
+            <a:avLst/>
+          </a:prstGeom>
+        </p:spPr>
+        <p:txBody>
+          <a:bodyPr vert="horz" lIns="91440" tIns="45720" rIns="91440" bIns="45720" rtlCol="0" anchor="ctr">
+            <a:normAutofit/>
+          </a:bodyPr>
+          <a:lstStyle>
+            <a:lvl1pPr algn="ctr" defTabSz="914400" rtl="0" eaLnBrk="1" latinLnBrk="0" hangingPunct="1">
+              <a:spcBef>
+                <a:spcPct val="0"/>
+              </a:spcBef>
+              <a:buNone/>
+              <a:defRPr sz="4400" kern="1200">
+                <a:solidFill>
+                  <a:schemeClr val="tx1"/>
+                </a:solidFill>
+                <a:latin typeface="+mj-lt"/>
+                <a:ea typeface="+mj-ea"/>
+                <a:cs typeface="+mj-cs"/>
+              </a:defRPr>
+            </a:lvl1pPr>
+          </a:lstStyle>
+          <a:p>
+            <a:r>
+              <a:rPr lang="en-US" sz="3000" dirty="0">
+                <a:solidFill>
+                  <a:srgbClr val="FF0000"/>
+                </a:solidFill>
+                <a:cs typeface="Calibri"/>
+              </a:rPr>
+              <a:t>CLICK THE RIGHT KEY TO CONTINUE</a:t>
+            </a:r>
+          </a:p>
+        </p:txBody>
+      </p:sp>
+      <p:sp>
+        <p:nvSpPr>
+          <p:cNvPr id="3" name="Right Arrow 12">
+            <a:extLst>
+              <a:ext uri="{FF2B5EF4-FFF2-40B4-BE49-F238E27FC236}">
+                <a16:creationId xmlns:a16="http://schemas.microsoft.com/office/drawing/2014/main" id="{B670D590-D386-4EBA-B0BF-F4CDB2DF6933}"/>
+              </a:ext>
+            </a:extLst>
+          </p:cNvPr>
+          <p:cNvSpPr/>
+          <p:nvPr/>
+        </p:nvSpPr>
+        <p:spPr>
+          <a:xfrm>
+            <a:off x="8113318" y="6391826"/>
+            <a:ext cx="640200" cy="289763"/>
+          </a:xfrm>
+          <a:prstGeom prst="rightArrow">
+            <a:avLst/>
+          </a:prstGeom>
+          <a:solidFill>
+            <a:schemeClr val="tx1"/>
+          </a:solidFill>
+          <a:ln>
+            <a:noFill/>
+          </a:ln>
+        </p:spPr>
+        <p:style>
+          <a:lnRef idx="1">
+            <a:schemeClr val="accent1"/>
+          </a:lnRef>
+          <a:fillRef idx="3">
+            <a:schemeClr val="accent1"/>
+          </a:fillRef>
+          <a:effectRef idx="2">
+            <a:schemeClr val="accent1"/>
+          </a:effectRef>
+          <a:fontRef idx="minor">
+            <a:schemeClr val="lt1"/>
+          </a:fontRef>
+        </p:style>
+        <p:txBody>
+          <a:bodyPr rtlCol="0" anchor="ctr"/>
+          <a:lstStyle/>
+          <a:p>
+            <a:pPr algn="ctr"/>
+            <a:endParaRPr lang="en-US"/>
+          </a:p>
+        </p:txBody>
+      </p:sp>
+      <p:sp>
+        <p:nvSpPr>
+          <p:cNvPr id="5" name="TextBox 4">
+            <a:extLst>
+              <a:ext uri="{FF2B5EF4-FFF2-40B4-BE49-F238E27FC236}">
+                <a16:creationId xmlns:a16="http://schemas.microsoft.com/office/drawing/2014/main" id="{FA8803B1-4B33-004F-B3D2-AD86FEDA44F7}"/>
+              </a:ext>
+            </a:extLst>
+          </p:cNvPr>
+          <p:cNvSpPr txBox="1"/>
+          <p:nvPr/>
+        </p:nvSpPr>
+        <p:spPr>
+          <a:xfrm>
+            <a:off x="3339790" y="5160269"/>
+            <a:ext cx="2464420" cy="830997"/>
+          </a:xfrm>
+          <a:prstGeom prst="rect">
+            <a:avLst/>
+          </a:prstGeom>
+          <a:noFill/>
+        </p:spPr>
+        <p:txBody>
+          <a:bodyPr wrap="square" rtlCol="0">
+            <a:spAutoFit/>
+          </a:bodyPr>
+          <a:lstStyle/>
+          <a:p>
+            <a:pPr algn="ctr"/>
+            <a:r>
+              <a:rPr lang="en-US" sz="2400" dirty="0"/>
+              <a:t>A</a:t>
+            </a:r>
+          </a:p>
+          <a:p>
+            <a:pPr algn="ctr"/>
+            <a:r>
+              <a:rPr lang="en-US" sz="2400" dirty="0"/>
+              <a:t>Run 2</a:t>
+            </a:r>
+          </a:p>
+        </p:txBody>
+      </p:sp>
+    </p:spTree>
+    <p:extLst>
+      <p:ext uri="{BB962C8B-B14F-4D97-AF65-F5344CB8AC3E}">
+        <p14:creationId xmlns:p14="http://schemas.microsoft.com/office/powerpoint/2010/main" val="1991996341"/>
+      </p:ext>
+    </p:extLst>
+  </p:cSld>
+  <p:clrMapOvr>
+    <a:masterClrMapping/>
+  </p:clrMapOvr>
+</p:sld>
+</file>
+
+<file path=ppt/slides/slide28.xml><?xml version="1.0" encoding="utf-8"?>
+<p:sld xmlns:a="http://schemas.openxmlformats.org/drawingml/2006/main" xmlns:r="http://schemas.openxmlformats.org/officeDocument/2006/relationships" xmlns:p="http://schemas.openxmlformats.org/presentationml/2006/main">
+  <p:cSld>
+    <p:spTree>
+      <p:nvGrpSpPr>
+        <p:cNvPr id="1" name=""/>
+        <p:cNvGrpSpPr/>
+        <p:nvPr/>
+      </p:nvGrpSpPr>
+      <p:grpSpPr>
+        <a:xfrm>
+          <a:off x="0" y="0"/>
+          <a:ext cx="0" cy="0"/>
+          <a:chOff x="0" y="0"/>
+          <a:chExt cx="0" cy="0"/>
+        </a:xfrm>
+      </p:grpSpPr>
+      <p:sp>
+        <p:nvSpPr>
+          <p:cNvPr id="4" name="Title 3"/>
+          <p:cNvSpPr>
+            <a:spLocks noGrp="1"/>
+          </p:cNvSpPr>
+          <p:nvPr>
+            <p:ph type="ctrTitle"/>
+          </p:nvPr>
+        </p:nvSpPr>
+        <p:spPr>
+          <a:xfrm>
+            <a:off x="364343" y="2130425"/>
+            <a:ext cx="8458200" cy="1470025"/>
+          </a:xfrm>
+        </p:spPr>
+        <p:txBody>
+          <a:bodyPr>
+            <a:normAutofit/>
+          </a:bodyPr>
+          <a:lstStyle/>
+          <a:p>
+            <a:r>
+              <a:rPr lang="en-US" dirty="0"/>
+              <a:t>NCAIR Remote Stimulus Task</a:t>
+            </a:r>
+          </a:p>
+        </p:txBody>
+      </p:sp>
+      <p:pic>
+        <p:nvPicPr>
+          <p:cNvPr id="9" name="Picture 8"/>
+          <p:cNvPicPr>
+            <a:picLocks noChangeAspect="1"/>
+          </p:cNvPicPr>
+          <p:nvPr/>
+        </p:nvPicPr>
+        <p:blipFill>
+          <a:blip r:embed="rId3">
+            <a:extLst>
+              <a:ext uri="{28A0092B-C50C-407E-A947-70E740481C1C}">
+                <a14:useLocalDpi xmlns:a14="http://schemas.microsoft.com/office/drawing/2010/main" val="0"/>
+              </a:ext>
+            </a:extLst>
+          </a:blip>
+          <a:stretch>
+            <a:fillRect/>
+          </a:stretch>
+        </p:blipFill>
+        <p:spPr>
+          <a:xfrm>
+            <a:off x="7061982" y="236743"/>
+            <a:ext cx="1760561" cy="333863"/>
+          </a:xfrm>
+          <a:prstGeom prst="rect">
+            <a:avLst/>
+          </a:prstGeom>
+        </p:spPr>
+      </p:pic>
+      <p:sp>
+        <p:nvSpPr>
+          <p:cNvPr id="2" name="Title 3">
+            <a:extLst>
+              <a:ext uri="{FF2B5EF4-FFF2-40B4-BE49-F238E27FC236}">
+                <a16:creationId xmlns:a16="http://schemas.microsoft.com/office/drawing/2014/main" id="{A9CEA40B-5234-42D7-930C-3D1F04A17646}"/>
+              </a:ext>
+            </a:extLst>
+          </p:cNvPr>
+          <p:cNvSpPr txBox="1">
+            <a:spLocks/>
+          </p:cNvSpPr>
+          <p:nvPr/>
+        </p:nvSpPr>
+        <p:spPr>
+          <a:xfrm>
+            <a:off x="18856" y="6208354"/>
+            <a:ext cx="9149174" cy="656705"/>
+          </a:xfrm>
+          <a:prstGeom prst="rect">
+            <a:avLst/>
+          </a:prstGeom>
+        </p:spPr>
+        <p:txBody>
+          <a:bodyPr vert="horz" lIns="91440" tIns="45720" rIns="91440" bIns="45720" rtlCol="0" anchor="ctr">
+            <a:normAutofit/>
+          </a:bodyPr>
+          <a:lstStyle>
+            <a:lvl1pPr algn="ctr" defTabSz="914400" rtl="0" eaLnBrk="1" latinLnBrk="0" hangingPunct="1">
+              <a:spcBef>
+                <a:spcPct val="0"/>
+              </a:spcBef>
+              <a:buNone/>
+              <a:defRPr sz="4400" kern="1200">
+                <a:solidFill>
+                  <a:schemeClr val="tx1"/>
+                </a:solidFill>
+                <a:latin typeface="+mj-lt"/>
+                <a:ea typeface="+mj-ea"/>
+                <a:cs typeface="+mj-cs"/>
+              </a:defRPr>
+            </a:lvl1pPr>
+          </a:lstStyle>
+          <a:p>
+            <a:r>
+              <a:rPr lang="en-US" sz="3000" dirty="0">
+                <a:solidFill>
+                  <a:srgbClr val="FF0000"/>
+                </a:solidFill>
+                <a:cs typeface="Calibri"/>
+              </a:rPr>
+              <a:t>CLICK THE RIGHT KEY TO CONTINUE</a:t>
+            </a:r>
+          </a:p>
+        </p:txBody>
+      </p:sp>
+      <p:sp>
+        <p:nvSpPr>
+          <p:cNvPr id="3" name="Right Arrow 12">
+            <a:extLst>
+              <a:ext uri="{FF2B5EF4-FFF2-40B4-BE49-F238E27FC236}">
+                <a16:creationId xmlns:a16="http://schemas.microsoft.com/office/drawing/2014/main" id="{B670D590-D386-4EBA-B0BF-F4CDB2DF6933}"/>
+              </a:ext>
+            </a:extLst>
+          </p:cNvPr>
+          <p:cNvSpPr/>
+          <p:nvPr/>
+        </p:nvSpPr>
+        <p:spPr>
+          <a:xfrm>
+            <a:off x="8113318" y="6391826"/>
+            <a:ext cx="640200" cy="289763"/>
+          </a:xfrm>
+          <a:prstGeom prst="rightArrow">
+            <a:avLst/>
+          </a:prstGeom>
+          <a:solidFill>
+            <a:schemeClr val="tx1"/>
+          </a:solidFill>
+          <a:ln>
+            <a:noFill/>
+          </a:ln>
+        </p:spPr>
+        <p:style>
+          <a:lnRef idx="1">
+            <a:schemeClr val="accent1"/>
+          </a:lnRef>
+          <a:fillRef idx="3">
+            <a:schemeClr val="accent1"/>
+          </a:fillRef>
+          <a:effectRef idx="2">
+            <a:schemeClr val="accent1"/>
+          </a:effectRef>
+          <a:fontRef idx="minor">
+            <a:schemeClr val="lt1"/>
+          </a:fontRef>
+        </p:style>
+        <p:txBody>
+          <a:bodyPr rtlCol="0" anchor="ctr"/>
+          <a:lstStyle/>
+          <a:p>
+            <a:pPr algn="ctr"/>
+            <a:endParaRPr lang="en-US"/>
+          </a:p>
+        </p:txBody>
+      </p:sp>
+      <p:sp>
+        <p:nvSpPr>
+          <p:cNvPr id="5" name="TextBox 4">
+            <a:extLst>
+              <a:ext uri="{FF2B5EF4-FFF2-40B4-BE49-F238E27FC236}">
+                <a16:creationId xmlns:a16="http://schemas.microsoft.com/office/drawing/2014/main" id="{FA8803B1-4B33-004F-B3D2-AD86FEDA44F7}"/>
+              </a:ext>
+            </a:extLst>
+          </p:cNvPr>
+          <p:cNvSpPr txBox="1"/>
+          <p:nvPr/>
+        </p:nvSpPr>
+        <p:spPr>
+          <a:xfrm>
+            <a:off x="3339790" y="5160269"/>
+            <a:ext cx="2464420" cy="830997"/>
+          </a:xfrm>
+          <a:prstGeom prst="rect">
+            <a:avLst/>
+          </a:prstGeom>
+          <a:noFill/>
+        </p:spPr>
+        <p:txBody>
+          <a:bodyPr wrap="square" rtlCol="0">
+            <a:spAutoFit/>
+          </a:bodyPr>
+          <a:lstStyle/>
+          <a:p>
+            <a:pPr algn="ctr"/>
+            <a:r>
+              <a:rPr lang="en-US" sz="2400" dirty="0"/>
+              <a:t>A</a:t>
+            </a:r>
+          </a:p>
+          <a:p>
+            <a:pPr algn="ctr"/>
+            <a:r>
+              <a:rPr lang="en-US" sz="2400" dirty="0"/>
+              <a:t>Run 3</a:t>
+            </a:r>
+          </a:p>
+        </p:txBody>
+      </p:sp>
+    </p:spTree>
+    <p:extLst>
+      <p:ext uri="{BB962C8B-B14F-4D97-AF65-F5344CB8AC3E}">
+        <p14:creationId xmlns:p14="http://schemas.microsoft.com/office/powerpoint/2010/main" val="1359930526"/>
+      </p:ext>
+    </p:extLst>
+  </p:cSld>
+  <p:clrMapOvr>
+    <a:masterClrMapping/>
+  </p:clrMapOvr>
+</p:sld>
+</file>
+
+<file path=ppt/slides/slide29.xml><?xml version="1.0" encoding="utf-8"?>
+<p:sld xmlns:a="http://schemas.openxmlformats.org/drawingml/2006/main" xmlns:r="http://schemas.openxmlformats.org/officeDocument/2006/relationships" xmlns:p="http://schemas.openxmlformats.org/presentationml/2006/main">
+  <p:cSld>
+    <p:spTree>
+      <p:nvGrpSpPr>
+        <p:cNvPr id="1" name=""/>
+        <p:cNvGrpSpPr/>
+        <p:nvPr/>
+      </p:nvGrpSpPr>
+      <p:grpSpPr>
+        <a:xfrm>
+          <a:off x="0" y="0"/>
+          <a:ext cx="0" cy="0"/>
+          <a:chOff x="0" y="0"/>
+          <a:chExt cx="0" cy="0"/>
+        </a:xfrm>
+      </p:grpSpPr>
+      <p:sp>
+        <p:nvSpPr>
+          <p:cNvPr id="3" name="Content Placeholder 2"/>
+          <p:cNvSpPr>
+            <a:spLocks noGrp="1"/>
+          </p:cNvSpPr>
+          <p:nvPr>
+            <p:ph idx="1"/>
+          </p:nvPr>
+        </p:nvSpPr>
+        <p:spPr>
+          <a:xfrm>
+            <a:off x="202799" y="176410"/>
+            <a:ext cx="8738402" cy="6024883"/>
+          </a:xfrm>
+        </p:spPr>
+        <p:txBody>
+          <a:bodyPr vert="horz" lIns="91440" tIns="45720" rIns="91440" bIns="45720" rtlCol="0" anchor="t">
+            <a:noAutofit/>
+          </a:bodyPr>
+          <a:lstStyle/>
+          <a:p>
+            <a:pPr marL="0" indent="0">
+              <a:spcAft>
+                <a:spcPts val="800"/>
+              </a:spcAft>
+              <a:buNone/>
+            </a:pPr>
+            <a:r>
+              <a:rPr lang="en-US" dirty="0"/>
+              <a:t>In this task, you will watch a series of videos. After each video, you will be asked to respond to this question:</a:t>
+            </a:r>
+          </a:p>
+          <a:p>
+            <a:pPr marL="0" indent="0">
+              <a:spcAft>
+                <a:spcPts val="600"/>
+              </a:spcAft>
+              <a:buNone/>
+            </a:pPr>
+            <a:endParaRPr lang="en-US" sz="2400" b="1" dirty="0">
+              <a:cs typeface="Calibri"/>
+            </a:endParaRPr>
+          </a:p>
+          <a:p>
+            <a:pPr marL="0" indent="0">
+              <a:spcAft>
+                <a:spcPts val="600"/>
+              </a:spcAft>
+              <a:buNone/>
+            </a:pPr>
+            <a:r>
+              <a:rPr lang="en-US" sz="2400" b="1" dirty="0">
+                <a:cs typeface="Calibri"/>
+              </a:rPr>
+              <a:t>	</a:t>
+            </a:r>
+          </a:p>
+          <a:p>
+            <a:pPr marL="0" indent="0">
+              <a:spcAft>
+                <a:spcPts val="600"/>
+              </a:spcAft>
+              <a:buNone/>
+            </a:pPr>
+            <a:endParaRPr lang="en-US" sz="2400" b="1" dirty="0">
+              <a:cs typeface="Calibri"/>
+            </a:endParaRPr>
+          </a:p>
+          <a:p>
+            <a:pPr marL="0" indent="0">
+              <a:spcAft>
+                <a:spcPts val="600"/>
+              </a:spcAft>
+              <a:buNone/>
+            </a:pPr>
+            <a:r>
+              <a:rPr lang="en-US" sz="2400" b="1" dirty="0">
+                <a:cs typeface="Calibri"/>
+              </a:rPr>
+              <a:t>	Arousal: </a:t>
+            </a:r>
+            <a:r>
+              <a:rPr lang="en-US" sz="2400" dirty="0">
+                <a:cs typeface="Calibri"/>
+              </a:rPr>
+              <a:t>Rate your arousal in response to this video.                   		 </a:t>
+            </a:r>
+            <a:r>
+              <a:rPr lang="en-US" sz="2000" dirty="0">
+                <a:cs typeface="Calibri"/>
+              </a:rPr>
+              <a:t>(1-9) 1 = calm  5 = middle  9 = excited</a:t>
+            </a:r>
+            <a:endParaRPr lang="en-US" sz="2400" dirty="0">
+              <a:cs typeface="Calibri"/>
+            </a:endParaRPr>
+          </a:p>
+        </p:txBody>
+      </p:sp>
+      <p:sp>
+        <p:nvSpPr>
+          <p:cNvPr id="6" name="Right Arrow 12">
+            <a:extLst>
+              <a:ext uri="{FF2B5EF4-FFF2-40B4-BE49-F238E27FC236}">
+                <a16:creationId xmlns:a16="http://schemas.microsoft.com/office/drawing/2014/main" id="{61AD207B-49C0-5D4C-8F58-875D2B1B3D00}"/>
+              </a:ext>
+            </a:extLst>
+          </p:cNvPr>
+          <p:cNvSpPr/>
+          <p:nvPr/>
+        </p:nvSpPr>
+        <p:spPr>
+          <a:xfrm>
+            <a:off x="8113318" y="6391826"/>
+            <a:ext cx="640200" cy="289763"/>
+          </a:xfrm>
+          <a:prstGeom prst="rightArrow">
+            <a:avLst/>
+          </a:prstGeom>
+          <a:solidFill>
+            <a:schemeClr val="tx1"/>
+          </a:solidFill>
+          <a:ln>
+            <a:noFill/>
+          </a:ln>
+        </p:spPr>
+        <p:style>
+          <a:lnRef idx="1">
+            <a:schemeClr val="accent1"/>
+          </a:lnRef>
+          <a:fillRef idx="3">
+            <a:schemeClr val="accent1"/>
+          </a:fillRef>
+          <a:effectRef idx="2">
+            <a:schemeClr val="accent1"/>
+          </a:effectRef>
+          <a:fontRef idx="minor">
+            <a:schemeClr val="lt1"/>
+          </a:fontRef>
+        </p:style>
+        <p:txBody>
+          <a:bodyPr rtlCol="0" anchor="ctr"/>
+          <a:lstStyle/>
+          <a:p>
+            <a:pPr algn="ctr"/>
+            <a:endParaRPr lang="en-US"/>
+          </a:p>
+        </p:txBody>
+      </p:sp>
+      <p:sp>
+        <p:nvSpPr>
+          <p:cNvPr id="7" name="Title 3">
+            <a:extLst>
+              <a:ext uri="{FF2B5EF4-FFF2-40B4-BE49-F238E27FC236}">
+                <a16:creationId xmlns:a16="http://schemas.microsoft.com/office/drawing/2014/main" id="{DD13525A-E8DC-B54B-BDDC-476469EBEBF2}"/>
+              </a:ext>
+            </a:extLst>
+          </p:cNvPr>
+          <p:cNvSpPr txBox="1">
+            <a:spLocks/>
+          </p:cNvSpPr>
+          <p:nvPr/>
+        </p:nvSpPr>
+        <p:spPr>
+          <a:xfrm>
+            <a:off x="18856" y="6208354"/>
+            <a:ext cx="9149174" cy="656705"/>
+          </a:xfrm>
+          <a:prstGeom prst="rect">
+            <a:avLst/>
+          </a:prstGeom>
+        </p:spPr>
+        <p:txBody>
+          <a:bodyPr vert="horz" lIns="91440" tIns="45720" rIns="91440" bIns="45720" rtlCol="0" anchor="ctr">
+            <a:normAutofit/>
+          </a:bodyPr>
+          <a:lstStyle>
+            <a:lvl1pPr algn="ctr" defTabSz="914400" rtl="0" eaLnBrk="1" latinLnBrk="0" hangingPunct="1">
+              <a:spcBef>
+                <a:spcPct val="0"/>
+              </a:spcBef>
+              <a:buNone/>
+              <a:defRPr sz="4400" kern="1200">
+                <a:solidFill>
+                  <a:schemeClr val="tx1"/>
+                </a:solidFill>
+                <a:latin typeface="+mj-lt"/>
+                <a:ea typeface="+mj-ea"/>
+                <a:cs typeface="+mj-cs"/>
+              </a:defRPr>
+            </a:lvl1pPr>
+          </a:lstStyle>
+          <a:p>
+            <a:r>
+              <a:rPr lang="en-US" sz="3000" dirty="0">
+                <a:solidFill>
+                  <a:srgbClr val="FF0000"/>
+                </a:solidFill>
+                <a:cs typeface="Calibri"/>
+              </a:rPr>
+              <a:t>CLICK THE RIGHT KEY TO CONTINUE</a:t>
+            </a:r>
+          </a:p>
+        </p:txBody>
+      </p:sp>
+    </p:spTree>
+    <p:extLst>
+      <p:ext uri="{BB962C8B-B14F-4D97-AF65-F5344CB8AC3E}">
+        <p14:creationId xmlns:p14="http://schemas.microsoft.com/office/powerpoint/2010/main" val="671214903"/>
+      </p:ext>
+    </p:extLst>
+  </p:cSld>
+  <p:clrMapOvr>
+    <a:masterClrMapping/>
+  </p:clrMapOvr>
+</p:sld>
+</file>
+
+<file path=ppt/slides/slide3.xml><?xml version="1.0" encoding="utf-8"?>
+<p:sld xmlns:a="http://schemas.openxmlformats.org/drawingml/2006/main" xmlns:r="http://schemas.openxmlformats.org/officeDocument/2006/relationships" xmlns:p="http://schemas.openxmlformats.org/presentationml/2006/main">
+  <p:cSld>
+    <p:spTree>
+      <p:nvGrpSpPr>
+        <p:cNvPr id="1" name=""/>
+        <p:cNvGrpSpPr/>
+        <p:nvPr/>
+      </p:nvGrpSpPr>
+      <p:grpSpPr>
+        <a:xfrm>
+          <a:off x="0" y="0"/>
+          <a:ext cx="0" cy="0"/>
+          <a:chOff x="0" y="0"/>
+          <a:chExt cx="0" cy="0"/>
+        </a:xfrm>
+      </p:grpSpPr>
+      <p:sp>
+        <p:nvSpPr>
+          <p:cNvPr id="4" name="Title 3"/>
+          <p:cNvSpPr>
+            <a:spLocks noGrp="1"/>
+          </p:cNvSpPr>
+          <p:nvPr>
+            <p:ph type="ctrTitle"/>
+          </p:nvPr>
+        </p:nvSpPr>
+        <p:spPr>
+          <a:xfrm>
+            <a:off x="364343" y="2130425"/>
+            <a:ext cx="8458200" cy="1470025"/>
+          </a:xfrm>
+        </p:spPr>
+        <p:txBody>
+          <a:bodyPr>
+            <a:normAutofit/>
+          </a:bodyPr>
+          <a:lstStyle/>
+          <a:p>
+            <a:r>
+              <a:rPr lang="en-US" dirty="0"/>
+              <a:t>NCAIR Remote Stimulus Task</a:t>
+            </a:r>
+          </a:p>
+        </p:txBody>
+      </p:sp>
+      <p:pic>
+        <p:nvPicPr>
+          <p:cNvPr id="9" name="Picture 8"/>
+          <p:cNvPicPr>
+            <a:picLocks noChangeAspect="1"/>
+          </p:cNvPicPr>
+          <p:nvPr/>
+        </p:nvPicPr>
+        <p:blipFill>
+          <a:blip r:embed="rId3">
+            <a:extLst>
+              <a:ext uri="{28A0092B-C50C-407E-A947-70E740481C1C}">
+                <a14:useLocalDpi xmlns:a14="http://schemas.microsoft.com/office/drawing/2010/main" val="0"/>
+              </a:ext>
+            </a:extLst>
+          </a:blip>
+          <a:stretch>
+            <a:fillRect/>
+          </a:stretch>
+        </p:blipFill>
+        <p:spPr>
+          <a:xfrm>
+            <a:off x="7061982" y="236743"/>
+            <a:ext cx="1760561" cy="333863"/>
+          </a:xfrm>
+          <a:prstGeom prst="rect">
+            <a:avLst/>
+          </a:prstGeom>
+        </p:spPr>
+      </p:pic>
+      <p:sp>
+        <p:nvSpPr>
+          <p:cNvPr id="2" name="Title 3">
+            <a:extLst>
+              <a:ext uri="{FF2B5EF4-FFF2-40B4-BE49-F238E27FC236}">
+                <a16:creationId xmlns:a16="http://schemas.microsoft.com/office/drawing/2014/main" id="{A9CEA40B-5234-42D7-930C-3D1F04A17646}"/>
+              </a:ext>
+            </a:extLst>
+          </p:cNvPr>
+          <p:cNvSpPr txBox="1">
+            <a:spLocks/>
+          </p:cNvSpPr>
+          <p:nvPr/>
+        </p:nvSpPr>
+        <p:spPr>
+          <a:xfrm>
+            <a:off x="18856" y="6208354"/>
+            <a:ext cx="9149174" cy="656705"/>
+          </a:xfrm>
+          <a:prstGeom prst="rect">
+            <a:avLst/>
+          </a:prstGeom>
+        </p:spPr>
+        <p:txBody>
+          <a:bodyPr vert="horz" lIns="91440" tIns="45720" rIns="91440" bIns="45720" rtlCol="0" anchor="ctr">
+            <a:normAutofit/>
+          </a:bodyPr>
+          <a:lstStyle>
+            <a:lvl1pPr algn="ctr" defTabSz="914400" rtl="0" eaLnBrk="1" latinLnBrk="0" hangingPunct="1">
+              <a:spcBef>
+                <a:spcPct val="0"/>
+              </a:spcBef>
+              <a:buNone/>
+              <a:defRPr sz="4400" kern="1200">
+                <a:solidFill>
+                  <a:schemeClr val="tx1"/>
+                </a:solidFill>
+                <a:latin typeface="+mj-lt"/>
+                <a:ea typeface="+mj-ea"/>
+                <a:cs typeface="+mj-cs"/>
+              </a:defRPr>
+            </a:lvl1pPr>
+          </a:lstStyle>
+          <a:p>
+            <a:r>
+              <a:rPr lang="en-US" sz="3000" dirty="0">
+                <a:solidFill>
+                  <a:srgbClr val="FF0000"/>
+                </a:solidFill>
+                <a:cs typeface="Calibri"/>
+              </a:rPr>
+              <a:t>CLICK THE RIGHT KEY TO CONTINUE</a:t>
+            </a:r>
+          </a:p>
+        </p:txBody>
+      </p:sp>
+      <p:sp>
+        <p:nvSpPr>
+          <p:cNvPr id="3" name="Right Arrow 12">
+            <a:extLst>
+              <a:ext uri="{FF2B5EF4-FFF2-40B4-BE49-F238E27FC236}">
+                <a16:creationId xmlns:a16="http://schemas.microsoft.com/office/drawing/2014/main" id="{B670D590-D386-4EBA-B0BF-F4CDB2DF6933}"/>
+              </a:ext>
+            </a:extLst>
+          </p:cNvPr>
+          <p:cNvSpPr/>
+          <p:nvPr/>
+        </p:nvSpPr>
+        <p:spPr>
+          <a:xfrm>
+            <a:off x="8113318" y="6391826"/>
+            <a:ext cx="640200" cy="289763"/>
+          </a:xfrm>
+          <a:prstGeom prst="rightArrow">
+            <a:avLst/>
+          </a:prstGeom>
+          <a:solidFill>
+            <a:schemeClr val="tx1"/>
+          </a:solidFill>
+          <a:ln>
+            <a:noFill/>
+          </a:ln>
+        </p:spPr>
+        <p:style>
+          <a:lnRef idx="1">
+            <a:schemeClr val="accent1"/>
+          </a:lnRef>
+          <a:fillRef idx="3">
+            <a:schemeClr val="accent1"/>
+          </a:fillRef>
+          <a:effectRef idx="2">
+            <a:schemeClr val="accent1"/>
+          </a:effectRef>
+          <a:fontRef idx="minor">
+            <a:schemeClr val="lt1"/>
+          </a:fontRef>
+        </p:style>
+        <p:txBody>
+          <a:bodyPr rtlCol="0" anchor="ctr"/>
+          <a:lstStyle/>
+          <a:p>
+            <a:pPr algn="ctr"/>
+            <a:endParaRPr lang="en-US"/>
+          </a:p>
+        </p:txBody>
+      </p:sp>
+      <p:sp>
+        <p:nvSpPr>
+          <p:cNvPr id="5" name="TextBox 4">
+            <a:extLst>
+              <a:ext uri="{FF2B5EF4-FFF2-40B4-BE49-F238E27FC236}">
+                <a16:creationId xmlns:a16="http://schemas.microsoft.com/office/drawing/2014/main" id="{FA8803B1-4B33-004F-B3D2-AD86FEDA44F7}"/>
+              </a:ext>
+            </a:extLst>
+          </p:cNvPr>
+          <p:cNvSpPr txBox="1"/>
+          <p:nvPr/>
+        </p:nvSpPr>
+        <p:spPr>
+          <a:xfrm>
             <a:off x="3339790" y="5631366"/>
             <a:ext cx="2464420" cy="461665"/>
           </a:xfrm>
@@ -8682,6 +10220,466 @@
     <p:extLst>
       <p:ext uri="{BB962C8B-B14F-4D97-AF65-F5344CB8AC3E}">
         <p14:creationId xmlns:p14="http://schemas.microsoft.com/office/powerpoint/2010/main" val="4079018348"/>
+      </p:ext>
+    </p:extLst>
+  </p:cSld>
+  <p:clrMapOvr>
+    <a:masterClrMapping/>
+  </p:clrMapOvr>
+</p:sld>
+</file>
+
+<file path=ppt/slides/slide30.xml><?xml version="1.0" encoding="utf-8"?>
+<p:sld xmlns:a="http://schemas.openxmlformats.org/drawingml/2006/main" xmlns:r="http://schemas.openxmlformats.org/officeDocument/2006/relationships" xmlns:p="http://schemas.openxmlformats.org/presentationml/2006/main">
+  <p:cSld>
+    <p:spTree>
+      <p:nvGrpSpPr>
+        <p:cNvPr id="1" name=""/>
+        <p:cNvGrpSpPr/>
+        <p:nvPr/>
+      </p:nvGrpSpPr>
+      <p:grpSpPr>
+        <a:xfrm>
+          <a:off x="0" y="0"/>
+          <a:ext cx="0" cy="0"/>
+          <a:chOff x="0" y="0"/>
+          <a:chExt cx="0" cy="0"/>
+        </a:xfrm>
+      </p:grpSpPr>
+      <p:sp>
+        <p:nvSpPr>
+          <p:cNvPr id="3" name="Content Placeholder 2"/>
+          <p:cNvSpPr>
+            <a:spLocks noGrp="1"/>
+          </p:cNvSpPr>
+          <p:nvPr>
+            <p:ph idx="1"/>
+          </p:nvPr>
+        </p:nvSpPr>
+        <p:spPr>
+          <a:xfrm>
+            <a:off x="202799" y="176410"/>
+            <a:ext cx="8738402" cy="6111267"/>
+          </a:xfrm>
+        </p:spPr>
+        <p:txBody>
+          <a:bodyPr vert="horz" lIns="91440" tIns="45720" rIns="91440" bIns="45720" rtlCol="0" anchor="t">
+            <a:noAutofit/>
+          </a:bodyPr>
+          <a:lstStyle/>
+          <a:p>
+            <a:pPr marL="0" indent="0">
+              <a:spcAft>
+                <a:spcPts val="1200"/>
+              </a:spcAft>
+              <a:buNone/>
+            </a:pPr>
+            <a:r>
+              <a:rPr lang="en-US" dirty="0"/>
+              <a:t>In this task, you will see a series of pictures. After each image, you will be asked to respond to this question:</a:t>
+            </a:r>
+          </a:p>
+          <a:p>
+            <a:pPr marL="0" indent="0">
+              <a:spcAft>
+                <a:spcPts val="600"/>
+              </a:spcAft>
+              <a:buNone/>
+            </a:pPr>
+            <a:endParaRPr lang="en-US" sz="2400" b="1" dirty="0">
+              <a:cs typeface="Calibri"/>
+            </a:endParaRPr>
+          </a:p>
+          <a:p>
+            <a:pPr marL="0" indent="0">
+              <a:spcAft>
+                <a:spcPts val="600"/>
+              </a:spcAft>
+              <a:buNone/>
+            </a:pPr>
+            <a:endParaRPr lang="en-US" sz="2400" b="1" dirty="0">
+              <a:cs typeface="Calibri"/>
+            </a:endParaRPr>
+          </a:p>
+          <a:p>
+            <a:pPr marL="0" indent="0" algn="ctr">
+              <a:spcAft>
+                <a:spcPts val="600"/>
+              </a:spcAft>
+              <a:buNone/>
+            </a:pPr>
+            <a:r>
+              <a:rPr lang="en-US" sz="2400" b="1" dirty="0">
+                <a:cs typeface="Calibri"/>
+              </a:rPr>
+              <a:t>Arousal: </a:t>
+            </a:r>
+            <a:r>
+              <a:rPr lang="en-US" sz="2400" dirty="0">
+                <a:cs typeface="Calibri"/>
+              </a:rPr>
+              <a:t>Rate your arousal in response to this picture.</a:t>
+            </a:r>
+          </a:p>
+          <a:p>
+            <a:pPr marL="0" indent="0" algn="ctr">
+              <a:spcAft>
+                <a:spcPts val="600"/>
+              </a:spcAft>
+              <a:buNone/>
+            </a:pPr>
+            <a:r>
+              <a:rPr lang="en-US" sz="2000" dirty="0">
+                <a:cs typeface="Calibri"/>
+              </a:rPr>
+              <a:t>(1-9) 1 = calm  5 = middle  9 = excited</a:t>
+            </a:r>
+            <a:endParaRPr lang="en-US" sz="2400" dirty="0">
+              <a:cs typeface="Calibri"/>
+            </a:endParaRPr>
+          </a:p>
+        </p:txBody>
+      </p:sp>
+      <p:sp>
+        <p:nvSpPr>
+          <p:cNvPr id="5" name="Title 3">
+            <a:extLst>
+              <a:ext uri="{FF2B5EF4-FFF2-40B4-BE49-F238E27FC236}">
+                <a16:creationId xmlns:a16="http://schemas.microsoft.com/office/drawing/2014/main" id="{53AD9BDC-D1D6-D34B-9246-0B7EC252ED38}"/>
+              </a:ext>
+            </a:extLst>
+          </p:cNvPr>
+          <p:cNvSpPr txBox="1">
+            <a:spLocks/>
+          </p:cNvSpPr>
+          <p:nvPr/>
+        </p:nvSpPr>
+        <p:spPr>
+          <a:xfrm>
+            <a:off x="18856" y="6208354"/>
+            <a:ext cx="9149174" cy="656705"/>
+          </a:xfrm>
+          <a:prstGeom prst="rect">
+            <a:avLst/>
+          </a:prstGeom>
+        </p:spPr>
+        <p:txBody>
+          <a:bodyPr vert="horz" lIns="91440" tIns="45720" rIns="91440" bIns="45720" rtlCol="0" anchor="ctr">
+            <a:normAutofit/>
+          </a:bodyPr>
+          <a:lstStyle>
+            <a:lvl1pPr algn="ctr" defTabSz="914400" rtl="0" eaLnBrk="1" latinLnBrk="0" hangingPunct="1">
+              <a:spcBef>
+                <a:spcPct val="0"/>
+              </a:spcBef>
+              <a:buNone/>
+              <a:defRPr sz="4400" kern="1200">
+                <a:solidFill>
+                  <a:schemeClr val="tx1"/>
+                </a:solidFill>
+                <a:latin typeface="+mj-lt"/>
+                <a:ea typeface="+mj-ea"/>
+                <a:cs typeface="+mj-cs"/>
+              </a:defRPr>
+            </a:lvl1pPr>
+          </a:lstStyle>
+          <a:p>
+            <a:r>
+              <a:rPr lang="en-US" sz="3000" dirty="0">
+                <a:solidFill>
+                  <a:srgbClr val="FF0000"/>
+                </a:solidFill>
+                <a:cs typeface="Calibri"/>
+              </a:rPr>
+              <a:t>CLICK THE RIGHT KEY TO CONTINUE</a:t>
+            </a:r>
+          </a:p>
+        </p:txBody>
+      </p:sp>
+      <p:sp>
+        <p:nvSpPr>
+          <p:cNvPr id="6" name="Right Arrow 12">
+            <a:extLst>
+              <a:ext uri="{FF2B5EF4-FFF2-40B4-BE49-F238E27FC236}">
+                <a16:creationId xmlns:a16="http://schemas.microsoft.com/office/drawing/2014/main" id="{178576FF-4B5E-3A44-980F-89AE5AF4D6D7}"/>
+              </a:ext>
+            </a:extLst>
+          </p:cNvPr>
+          <p:cNvSpPr/>
+          <p:nvPr/>
+        </p:nvSpPr>
+        <p:spPr>
+          <a:xfrm>
+            <a:off x="8113318" y="6391826"/>
+            <a:ext cx="640200" cy="289763"/>
+          </a:xfrm>
+          <a:prstGeom prst="rightArrow">
+            <a:avLst/>
+          </a:prstGeom>
+          <a:solidFill>
+            <a:schemeClr val="tx1"/>
+          </a:solidFill>
+          <a:ln>
+            <a:noFill/>
+          </a:ln>
+        </p:spPr>
+        <p:style>
+          <a:lnRef idx="1">
+            <a:schemeClr val="accent1"/>
+          </a:lnRef>
+          <a:fillRef idx="3">
+            <a:schemeClr val="accent1"/>
+          </a:fillRef>
+          <a:effectRef idx="2">
+            <a:schemeClr val="accent1"/>
+          </a:effectRef>
+          <a:fontRef idx="minor">
+            <a:schemeClr val="lt1"/>
+          </a:fontRef>
+        </p:style>
+        <p:txBody>
+          <a:bodyPr rtlCol="0" anchor="ctr"/>
+          <a:lstStyle/>
+          <a:p>
+            <a:pPr algn="ctr"/>
+            <a:endParaRPr lang="en-US"/>
+          </a:p>
+        </p:txBody>
+      </p:sp>
+    </p:spTree>
+    <p:extLst>
+      <p:ext uri="{BB962C8B-B14F-4D97-AF65-F5344CB8AC3E}">
+        <p14:creationId xmlns:p14="http://schemas.microsoft.com/office/powerpoint/2010/main" val="902043648"/>
+      </p:ext>
+    </p:extLst>
+  </p:cSld>
+  <p:clrMapOvr>
+    <a:masterClrMapping/>
+  </p:clrMapOvr>
+</p:sld>
+</file>
+
+<file path=ppt/slides/slide31.xml><?xml version="1.0" encoding="utf-8"?>
+<p:sld xmlns:a="http://schemas.openxmlformats.org/drawingml/2006/main" xmlns:r="http://schemas.openxmlformats.org/officeDocument/2006/relationships" xmlns:p="http://schemas.openxmlformats.org/presentationml/2006/main">
+  <p:cSld>
+    <p:spTree>
+      <p:nvGrpSpPr>
+        <p:cNvPr id="1" name=""/>
+        <p:cNvGrpSpPr/>
+        <p:nvPr/>
+      </p:nvGrpSpPr>
+      <p:grpSpPr>
+        <a:xfrm>
+          <a:off x="0" y="0"/>
+          <a:ext cx="0" cy="0"/>
+          <a:chOff x="0" y="0"/>
+          <a:chExt cx="0" cy="0"/>
+        </a:xfrm>
+      </p:grpSpPr>
+      <p:sp>
+        <p:nvSpPr>
+          <p:cNvPr id="3" name="Content Placeholder 2"/>
+          <p:cNvSpPr>
+            <a:spLocks noGrp="1"/>
+          </p:cNvSpPr>
+          <p:nvPr>
+            <p:ph idx="1"/>
+          </p:nvPr>
+        </p:nvSpPr>
+        <p:spPr>
+          <a:xfrm>
+            <a:off x="202799" y="176410"/>
+            <a:ext cx="8738402" cy="6111267"/>
+          </a:xfrm>
+        </p:spPr>
+        <p:txBody>
+          <a:bodyPr vert="horz" lIns="91440" tIns="45720" rIns="91440" bIns="45720" rtlCol="0" anchor="t">
+            <a:noAutofit/>
+          </a:bodyPr>
+          <a:lstStyle/>
+          <a:p>
+            <a:pPr marL="0" indent="0">
+              <a:spcAft>
+                <a:spcPts val="2400"/>
+              </a:spcAft>
+              <a:buNone/>
+            </a:pPr>
+            <a:r>
+              <a:rPr lang="en-US" dirty="0"/>
+              <a:t>In this task, you will listen to music clips. After each clip, you will be asked to respond to this question:</a:t>
+            </a:r>
+          </a:p>
+          <a:p>
+            <a:pPr marL="0" indent="0">
+              <a:spcAft>
+                <a:spcPts val="600"/>
+              </a:spcAft>
+              <a:buNone/>
+            </a:pPr>
+            <a:endParaRPr lang="en-US" sz="2400" b="1" dirty="0">
+              <a:cs typeface="Calibri"/>
+            </a:endParaRPr>
+          </a:p>
+          <a:p>
+            <a:pPr marL="0" indent="0">
+              <a:spcAft>
+                <a:spcPts val="600"/>
+              </a:spcAft>
+              <a:buNone/>
+            </a:pPr>
+            <a:endParaRPr lang="en-US" sz="2400" b="1" dirty="0">
+              <a:cs typeface="Calibri"/>
+            </a:endParaRPr>
+          </a:p>
+          <a:p>
+            <a:pPr marL="0" indent="0" algn="ctr">
+              <a:spcAft>
+                <a:spcPts val="600"/>
+              </a:spcAft>
+              <a:buNone/>
+            </a:pPr>
+            <a:r>
+              <a:rPr lang="en-US" sz="2400" b="1" dirty="0">
+                <a:cs typeface="Calibri"/>
+              </a:rPr>
+              <a:t>Arousal: </a:t>
+            </a:r>
+            <a:r>
+              <a:rPr lang="en-US" sz="2400" dirty="0">
+                <a:cs typeface="Calibri"/>
+              </a:rPr>
+              <a:t>Rate your arousal in response to this clip. </a:t>
+            </a:r>
+          </a:p>
+          <a:p>
+            <a:pPr marL="0" indent="0" algn="ctr">
+              <a:spcAft>
+                <a:spcPts val="600"/>
+              </a:spcAft>
+              <a:buNone/>
+            </a:pPr>
+            <a:r>
+              <a:rPr lang="en-US" sz="2000" dirty="0">
+                <a:cs typeface="Calibri"/>
+              </a:rPr>
+              <a:t>(1-9) 1 = calm  5 = middle  9 = excited</a:t>
+            </a:r>
+            <a:endParaRPr lang="en-US" sz="2400" dirty="0">
+              <a:cs typeface="Calibri"/>
+            </a:endParaRPr>
+          </a:p>
+        </p:txBody>
+      </p:sp>
+      <p:sp>
+        <p:nvSpPr>
+          <p:cNvPr id="5" name="Title 3">
+            <a:extLst>
+              <a:ext uri="{FF2B5EF4-FFF2-40B4-BE49-F238E27FC236}">
+                <a16:creationId xmlns:a16="http://schemas.microsoft.com/office/drawing/2014/main" id="{4A40E84C-8146-EC44-B63C-4B296B345500}"/>
+              </a:ext>
+            </a:extLst>
+          </p:cNvPr>
+          <p:cNvSpPr txBox="1">
+            <a:spLocks/>
+          </p:cNvSpPr>
+          <p:nvPr/>
+        </p:nvSpPr>
+        <p:spPr>
+          <a:xfrm>
+            <a:off x="18856" y="6208354"/>
+            <a:ext cx="9149174" cy="656705"/>
+          </a:xfrm>
+          <a:prstGeom prst="rect">
+            <a:avLst/>
+          </a:prstGeom>
+        </p:spPr>
+        <p:txBody>
+          <a:bodyPr vert="horz" lIns="91440" tIns="45720" rIns="91440" bIns="45720" rtlCol="0" anchor="ctr">
+            <a:normAutofit/>
+          </a:bodyPr>
+          <a:lstStyle>
+            <a:lvl1pPr algn="ctr" defTabSz="914400" rtl="0" eaLnBrk="1" latinLnBrk="0" hangingPunct="1">
+              <a:spcBef>
+                <a:spcPct val="0"/>
+              </a:spcBef>
+              <a:buNone/>
+              <a:defRPr sz="4400" kern="1200">
+                <a:solidFill>
+                  <a:schemeClr val="tx1"/>
+                </a:solidFill>
+                <a:latin typeface="+mj-lt"/>
+                <a:ea typeface="+mj-ea"/>
+                <a:cs typeface="+mj-cs"/>
+              </a:defRPr>
+            </a:lvl1pPr>
+          </a:lstStyle>
+          <a:p>
+            <a:r>
+              <a:rPr lang="en-US" sz="3000" dirty="0">
+                <a:solidFill>
+                  <a:srgbClr val="FF0000"/>
+                </a:solidFill>
+                <a:cs typeface="Calibri"/>
+              </a:rPr>
+              <a:t>CLICK THE RIGHT KEY TO CONTINUE</a:t>
+            </a:r>
+          </a:p>
+        </p:txBody>
+      </p:sp>
+      <p:sp>
+        <p:nvSpPr>
+          <p:cNvPr id="6" name="Right Arrow 12">
+            <a:extLst>
+              <a:ext uri="{FF2B5EF4-FFF2-40B4-BE49-F238E27FC236}">
+                <a16:creationId xmlns:a16="http://schemas.microsoft.com/office/drawing/2014/main" id="{9652E570-CAA2-6D4A-BC9E-66B32493DAA6}"/>
+              </a:ext>
+            </a:extLst>
+          </p:cNvPr>
+          <p:cNvSpPr/>
+          <p:nvPr/>
+        </p:nvSpPr>
+        <p:spPr>
+          <a:xfrm>
+            <a:off x="8113318" y="6391826"/>
+            <a:ext cx="640200" cy="289763"/>
+          </a:xfrm>
+          <a:prstGeom prst="rightArrow">
+            <a:avLst/>
+          </a:prstGeom>
+          <a:solidFill>
+            <a:schemeClr val="tx1"/>
+          </a:solidFill>
+          <a:ln>
+            <a:noFill/>
+          </a:ln>
+        </p:spPr>
+        <p:style>
+          <a:lnRef idx="1">
+            <a:schemeClr val="accent1"/>
+          </a:lnRef>
+          <a:fillRef idx="3">
+            <a:schemeClr val="accent1"/>
+          </a:fillRef>
+          <a:effectRef idx="2">
+            <a:schemeClr val="accent1"/>
+          </a:effectRef>
+          <a:fontRef idx="minor">
+            <a:schemeClr val="lt1"/>
+          </a:fontRef>
+        </p:style>
+        <p:txBody>
+          <a:bodyPr rtlCol="0" anchor="ctr"/>
+          <a:lstStyle/>
+          <a:p>
+            <a:pPr algn="ctr"/>
+            <a:endParaRPr lang="en-US"/>
+          </a:p>
+        </p:txBody>
+      </p:sp>
+    </p:spTree>
+    <p:extLst>
+      <p:ext uri="{BB962C8B-B14F-4D97-AF65-F5344CB8AC3E}">
+        <p14:creationId xmlns:p14="http://schemas.microsoft.com/office/powerpoint/2010/main" val="604483718"/>
       </p:ext>
     </p:extLst>
   </p:cSld>

</xml_diff>